<commit_message>
Update rapport sur triangulation
</commit_message>
<xml_diff>
--- a/3D/triangulation.pptx
+++ b/3D/triangulation.pptx
@@ -5,7 +5,7 @@
     <p:sldMasterId id="2147483648" r:id="rId1"/>
   </p:sldMasterIdLst>
   <p:notesMasterIdLst>
-    <p:notesMasterId r:id="rId8"/>
+    <p:notesMasterId r:id="rId9"/>
   </p:notesMasterIdLst>
   <p:sldIdLst>
     <p:sldId id="256" r:id="rId2"/>
@@ -14,6 +14,7 @@
     <p:sldId id="259" r:id="rId5"/>
     <p:sldId id="260" r:id="rId6"/>
     <p:sldId id="261" r:id="rId7"/>
+    <p:sldId id="262" r:id="rId8"/>
   </p:sldIdLst>
   <p:sldSz cx="12192000" cy="6858000"/>
   <p:notesSz cx="6858000" cy="9144000"/>
@@ -205,7 +206,7 @@
           <a:p>
             <a:fld id="{F160B275-E15A-477E-9FDC-96E2DF15BEB5}" type="datetimeFigureOut">
               <a:rPr lang="fr-FR" smtClean="0"/>
-              <a:t>24/01/2022</a:t>
+              <a:t>25/01/2022</a:t>
             </a:fld>
             <a:endParaRPr lang="fr-FR"/>
           </a:p>
@@ -684,7 +685,7 @@
           <a:p>
             <a:fld id="{F3452523-C4A0-4875-B071-9C8D2ABC8F20}" type="datetimeFigureOut">
               <a:rPr lang="fr-FR" smtClean="0"/>
-              <a:t>24/01/2022</a:t>
+              <a:t>25/01/2022</a:t>
             </a:fld>
             <a:endParaRPr lang="fr-FR"/>
           </a:p>
@@ -882,7 +883,7 @@
           <a:p>
             <a:fld id="{F3452523-C4A0-4875-B071-9C8D2ABC8F20}" type="datetimeFigureOut">
               <a:rPr lang="fr-FR" smtClean="0"/>
-              <a:t>24/01/2022</a:t>
+              <a:t>25/01/2022</a:t>
             </a:fld>
             <a:endParaRPr lang="fr-FR"/>
           </a:p>
@@ -1090,7 +1091,7 @@
           <a:p>
             <a:fld id="{F3452523-C4A0-4875-B071-9C8D2ABC8F20}" type="datetimeFigureOut">
               <a:rPr lang="fr-FR" smtClean="0"/>
-              <a:t>24/01/2022</a:t>
+              <a:t>25/01/2022</a:t>
             </a:fld>
             <a:endParaRPr lang="fr-FR"/>
           </a:p>
@@ -1288,7 +1289,7 @@
           <a:p>
             <a:fld id="{F3452523-C4A0-4875-B071-9C8D2ABC8F20}" type="datetimeFigureOut">
               <a:rPr lang="fr-FR" smtClean="0"/>
-              <a:t>24/01/2022</a:t>
+              <a:t>25/01/2022</a:t>
             </a:fld>
             <a:endParaRPr lang="fr-FR"/>
           </a:p>
@@ -1563,7 +1564,7 @@
           <a:p>
             <a:fld id="{F3452523-C4A0-4875-B071-9C8D2ABC8F20}" type="datetimeFigureOut">
               <a:rPr lang="fr-FR" smtClean="0"/>
-              <a:t>24/01/2022</a:t>
+              <a:t>25/01/2022</a:t>
             </a:fld>
             <a:endParaRPr lang="fr-FR"/>
           </a:p>
@@ -1828,7 +1829,7 @@
           <a:p>
             <a:fld id="{F3452523-C4A0-4875-B071-9C8D2ABC8F20}" type="datetimeFigureOut">
               <a:rPr lang="fr-FR" smtClean="0"/>
-              <a:t>24/01/2022</a:t>
+              <a:t>25/01/2022</a:t>
             </a:fld>
             <a:endParaRPr lang="fr-FR"/>
           </a:p>
@@ -2240,7 +2241,7 @@
           <a:p>
             <a:fld id="{F3452523-C4A0-4875-B071-9C8D2ABC8F20}" type="datetimeFigureOut">
               <a:rPr lang="fr-FR" smtClean="0"/>
-              <a:t>24/01/2022</a:t>
+              <a:t>25/01/2022</a:t>
             </a:fld>
             <a:endParaRPr lang="fr-FR"/>
           </a:p>
@@ -2381,7 +2382,7 @@
           <a:p>
             <a:fld id="{F3452523-C4A0-4875-B071-9C8D2ABC8F20}" type="datetimeFigureOut">
               <a:rPr lang="fr-FR" smtClean="0"/>
-              <a:t>24/01/2022</a:t>
+              <a:t>25/01/2022</a:t>
             </a:fld>
             <a:endParaRPr lang="fr-FR"/>
           </a:p>
@@ -2494,7 +2495,7 @@
           <a:p>
             <a:fld id="{F3452523-C4A0-4875-B071-9C8D2ABC8F20}" type="datetimeFigureOut">
               <a:rPr lang="fr-FR" smtClean="0"/>
-              <a:t>24/01/2022</a:t>
+              <a:t>25/01/2022</a:t>
             </a:fld>
             <a:endParaRPr lang="fr-FR"/>
           </a:p>
@@ -2805,7 +2806,7 @@
           <a:p>
             <a:fld id="{F3452523-C4A0-4875-B071-9C8D2ABC8F20}" type="datetimeFigureOut">
               <a:rPr lang="fr-FR" smtClean="0"/>
-              <a:t>24/01/2022</a:t>
+              <a:t>25/01/2022</a:t>
             </a:fld>
             <a:endParaRPr lang="fr-FR"/>
           </a:p>
@@ -3093,7 +3094,7 @@
           <a:p>
             <a:fld id="{F3452523-C4A0-4875-B071-9C8D2ABC8F20}" type="datetimeFigureOut">
               <a:rPr lang="fr-FR" smtClean="0"/>
-              <a:t>24/01/2022</a:t>
+              <a:t>25/01/2022</a:t>
             </a:fld>
             <a:endParaRPr lang="fr-FR"/>
           </a:p>
@@ -3334,7 +3335,7 @@
           <a:p>
             <a:fld id="{F3452523-C4A0-4875-B071-9C8D2ABC8F20}" type="datetimeFigureOut">
               <a:rPr lang="fr-FR" smtClean="0"/>
-              <a:t>24/01/2022</a:t>
+              <a:t>25/01/2022</a:t>
             </a:fld>
             <a:endParaRPr lang="fr-FR"/>
           </a:p>
@@ -8690,6 +8691,637 @@
     <p:extLst>
       <p:ext uri="{BB962C8B-B14F-4D97-AF65-F5344CB8AC3E}">
         <p14:creationId xmlns:p14="http://schemas.microsoft.com/office/powerpoint/2010/main" val="2035081721"/>
+      </p:ext>
+    </p:extLst>
+  </p:cSld>
+  <p:clrMapOvr>
+    <a:masterClrMapping/>
+  </p:clrMapOvr>
+</p:sld>
+</file>
+
+<file path=ppt/slides/slide7.xml><?xml version="1.0" encoding="utf-8"?>
+<p:sld xmlns:a="http://schemas.openxmlformats.org/drawingml/2006/main" xmlns:r="http://schemas.openxmlformats.org/officeDocument/2006/relationships" xmlns:p="http://schemas.openxmlformats.org/presentationml/2006/main">
+  <p:cSld>
+    <p:spTree>
+      <p:nvGrpSpPr>
+        <p:cNvPr id="1" name=""/>
+        <p:cNvGrpSpPr/>
+        <p:nvPr/>
+      </p:nvGrpSpPr>
+      <p:grpSpPr>
+        <a:xfrm>
+          <a:off x="0" y="0"/>
+          <a:ext cx="0" cy="0"/>
+          <a:chOff x="0" y="0"/>
+          <a:chExt cx="0" cy="0"/>
+        </a:xfrm>
+      </p:grpSpPr>
+      <p:pic>
+        <p:nvPicPr>
+          <p:cNvPr id="6" name="Image 5">
+            <a:extLst>
+              <a:ext uri="{FF2B5EF4-FFF2-40B4-BE49-F238E27FC236}">
+                <a16:creationId xmlns:a16="http://schemas.microsoft.com/office/drawing/2014/main" id="{98E7FF5C-468D-42F6-8DF4-EF473CD7B320}"/>
+              </a:ext>
+            </a:extLst>
+          </p:cNvPr>
+          <p:cNvPicPr>
+            <a:picLocks noChangeAspect="1"/>
+          </p:cNvPicPr>
+          <p:nvPr/>
+        </p:nvPicPr>
+        <p:blipFill>
+          <a:blip r:embed="rId2"/>
+          <a:stretch>
+            <a:fillRect/>
+          </a:stretch>
+        </p:blipFill>
+        <p:spPr>
+          <a:xfrm>
+            <a:off x="493285" y="1474640"/>
+            <a:ext cx="11205430" cy="4079853"/>
+          </a:xfrm>
+          <a:prstGeom prst="rect">
+            <a:avLst/>
+          </a:prstGeom>
+        </p:spPr>
+      </p:pic>
+      <p:cxnSp>
+        <p:nvCxnSpPr>
+          <p:cNvPr id="8" name="Connecteur droit 7">
+            <a:extLst>
+              <a:ext uri="{FF2B5EF4-FFF2-40B4-BE49-F238E27FC236}">
+                <a16:creationId xmlns:a16="http://schemas.microsoft.com/office/drawing/2014/main" id="{0AEABF97-4198-4CC2-91D2-883C6D849A3F}"/>
+              </a:ext>
+            </a:extLst>
+          </p:cNvPr>
+          <p:cNvCxnSpPr>
+            <a:cxnSpLocks/>
+          </p:cNvCxnSpPr>
+          <p:nvPr/>
+        </p:nvCxnSpPr>
+        <p:spPr>
+          <a:xfrm>
+            <a:off x="787089" y="3847289"/>
+            <a:ext cx="10555362" cy="0"/>
+          </a:xfrm>
+          <a:prstGeom prst="line">
+            <a:avLst/>
+          </a:prstGeom>
+          <a:ln w="76200">
+            <a:solidFill>
+              <a:srgbClr val="FF0000"/>
+            </a:solidFill>
+          </a:ln>
+        </p:spPr>
+        <p:style>
+          <a:lnRef idx="1">
+            <a:schemeClr val="accent1"/>
+          </a:lnRef>
+          <a:fillRef idx="0">
+            <a:schemeClr val="accent1"/>
+          </a:fillRef>
+          <a:effectRef idx="0">
+            <a:schemeClr val="accent1"/>
+          </a:effectRef>
+          <a:fontRef idx="minor">
+            <a:schemeClr val="tx1"/>
+          </a:fontRef>
+        </p:style>
+      </p:cxnSp>
+      <p:graphicFrame>
+        <p:nvGraphicFramePr>
+          <p:cNvPr id="5" name="Tableau 5">
+            <a:extLst>
+              <a:ext uri="{FF2B5EF4-FFF2-40B4-BE49-F238E27FC236}">
+                <a16:creationId xmlns:a16="http://schemas.microsoft.com/office/drawing/2014/main" id="{36FE7F61-0711-4F47-A2D1-B5F4E694FC5E}"/>
+              </a:ext>
+            </a:extLst>
+          </p:cNvPr>
+          <p:cNvGraphicFramePr>
+            <a:graphicFrameLocks noGrp="1"/>
+          </p:cNvGraphicFramePr>
+          <p:nvPr>
+            <p:extLst>
+              <p:ext uri="{D42A27DB-BD31-4B8C-83A1-F6EECF244321}">
+                <p14:modId xmlns:p14="http://schemas.microsoft.com/office/powerpoint/2010/main" val="1567507887"/>
+              </p:ext>
+            </p:extLst>
+          </p:nvPr>
+        </p:nvGraphicFramePr>
+        <p:xfrm>
+          <a:off x="3948348" y="3298649"/>
+          <a:ext cx="1080000" cy="1097280"/>
+        </p:xfrm>
+        <a:graphic>
+          <a:graphicData uri="http://schemas.openxmlformats.org/drawingml/2006/table">
+            <a:tbl>
+              <a:tblPr firstRow="1" bandRow="1">
+                <a:tableStyleId>{5C22544A-7EE6-4342-B048-85BDC9FD1C3A}</a:tableStyleId>
+              </a:tblPr>
+              <a:tblGrid>
+                <a:gridCol w="360000">
+                  <a:extLst>
+                    <a:ext uri="{9D8B030D-6E8A-4147-A177-3AD203B41FA5}">
+                      <a16:colId xmlns:a16="http://schemas.microsoft.com/office/drawing/2014/main" val="2020062703"/>
+                    </a:ext>
+                  </a:extLst>
+                </a:gridCol>
+                <a:gridCol w="360000">
+                  <a:extLst>
+                    <a:ext uri="{9D8B030D-6E8A-4147-A177-3AD203B41FA5}">
+                      <a16:colId xmlns:a16="http://schemas.microsoft.com/office/drawing/2014/main" val="296760931"/>
+                    </a:ext>
+                  </a:extLst>
+                </a:gridCol>
+                <a:gridCol w="360000">
+                  <a:extLst>
+                    <a:ext uri="{9D8B030D-6E8A-4147-A177-3AD203B41FA5}">
+                      <a16:colId xmlns:a16="http://schemas.microsoft.com/office/drawing/2014/main" val="2299146926"/>
+                    </a:ext>
+                  </a:extLst>
+                </a:gridCol>
+              </a:tblGrid>
+              <a:tr h="365760">
+                <a:tc>
+                  <a:txBody>
+                    <a:bodyPr/>
+                    <a:lstStyle/>
+                    <a:p>
+                      <a:endParaRPr lang="en-GB"/>
+                    </a:p>
+                  </a:txBody>
+                  <a:tcPr>
+                    <a:lnL w="12700" cap="flat" cmpd="sng" algn="ctr">
+                      <a:solidFill>
+                        <a:schemeClr val="tx1"/>
+                      </a:solidFill>
+                      <a:prstDash val="solid"/>
+                      <a:round/>
+                      <a:headEnd type="none" w="med" len="med"/>
+                      <a:tailEnd type="none" w="med" len="med"/>
+                    </a:lnL>
+                    <a:lnR w="12700" cap="flat" cmpd="sng" algn="ctr">
+                      <a:solidFill>
+                        <a:schemeClr val="tx1"/>
+                      </a:solidFill>
+                      <a:prstDash val="solid"/>
+                      <a:round/>
+                      <a:headEnd type="none" w="med" len="med"/>
+                      <a:tailEnd type="none" w="med" len="med"/>
+                    </a:lnR>
+                    <a:lnT w="12700" cap="flat" cmpd="sng" algn="ctr">
+                      <a:solidFill>
+                        <a:schemeClr val="tx1"/>
+                      </a:solidFill>
+                      <a:prstDash val="solid"/>
+                      <a:round/>
+                      <a:headEnd type="none" w="med" len="med"/>
+                      <a:tailEnd type="none" w="med" len="med"/>
+                    </a:lnT>
+                    <a:lnB w="12700" cap="flat" cmpd="sng" algn="ctr">
+                      <a:solidFill>
+                        <a:schemeClr val="tx1"/>
+                      </a:solidFill>
+                      <a:prstDash val="solid"/>
+                      <a:round/>
+                      <a:headEnd type="none" w="med" len="med"/>
+                      <a:tailEnd type="none" w="med" len="med"/>
+                    </a:lnB>
+                    <a:solidFill>
+                      <a:schemeClr val="bg1"/>
+                    </a:solidFill>
+                  </a:tcPr>
+                </a:tc>
+                <a:tc>
+                  <a:txBody>
+                    <a:bodyPr/>
+                    <a:lstStyle/>
+                    <a:p>
+                      <a:endParaRPr lang="en-GB" dirty="0"/>
+                    </a:p>
+                  </a:txBody>
+                  <a:tcPr>
+                    <a:lnL w="12700" cap="flat" cmpd="sng" algn="ctr">
+                      <a:solidFill>
+                        <a:schemeClr val="tx1"/>
+                      </a:solidFill>
+                      <a:prstDash val="solid"/>
+                      <a:round/>
+                      <a:headEnd type="none" w="med" len="med"/>
+                      <a:tailEnd type="none" w="med" len="med"/>
+                    </a:lnL>
+                    <a:lnR w="12700" cap="flat" cmpd="sng" algn="ctr">
+                      <a:solidFill>
+                        <a:schemeClr val="tx1"/>
+                      </a:solidFill>
+                      <a:prstDash val="solid"/>
+                      <a:round/>
+                      <a:headEnd type="none" w="med" len="med"/>
+                      <a:tailEnd type="none" w="med" len="med"/>
+                    </a:lnR>
+                    <a:lnT w="12700" cap="flat" cmpd="sng" algn="ctr">
+                      <a:solidFill>
+                        <a:schemeClr val="tx1"/>
+                      </a:solidFill>
+                      <a:prstDash val="solid"/>
+                      <a:round/>
+                      <a:headEnd type="none" w="med" len="med"/>
+                      <a:tailEnd type="none" w="med" len="med"/>
+                    </a:lnT>
+                    <a:lnB w="12700" cap="flat" cmpd="sng" algn="ctr">
+                      <a:solidFill>
+                        <a:schemeClr val="tx1"/>
+                      </a:solidFill>
+                      <a:prstDash val="solid"/>
+                      <a:round/>
+                      <a:headEnd type="none" w="med" len="med"/>
+                      <a:tailEnd type="none" w="med" len="med"/>
+                    </a:lnB>
+                    <a:solidFill>
+                      <a:schemeClr val="bg1"/>
+                    </a:solidFill>
+                  </a:tcPr>
+                </a:tc>
+                <a:tc>
+                  <a:txBody>
+                    <a:bodyPr/>
+                    <a:lstStyle/>
+                    <a:p>
+                      <a:endParaRPr lang="en-GB" dirty="0"/>
+                    </a:p>
+                  </a:txBody>
+                  <a:tcPr>
+                    <a:lnL w="12700" cap="flat" cmpd="sng" algn="ctr">
+                      <a:solidFill>
+                        <a:schemeClr val="tx1"/>
+                      </a:solidFill>
+                      <a:prstDash val="solid"/>
+                      <a:round/>
+                      <a:headEnd type="none" w="med" len="med"/>
+                      <a:tailEnd type="none" w="med" len="med"/>
+                    </a:lnL>
+                    <a:lnR w="12700" cap="flat" cmpd="sng" algn="ctr">
+                      <a:solidFill>
+                        <a:schemeClr val="tx1"/>
+                      </a:solidFill>
+                      <a:prstDash val="solid"/>
+                      <a:round/>
+                      <a:headEnd type="none" w="med" len="med"/>
+                      <a:tailEnd type="none" w="med" len="med"/>
+                    </a:lnR>
+                    <a:lnT w="12700" cap="flat" cmpd="sng" algn="ctr">
+                      <a:solidFill>
+                        <a:schemeClr val="tx1"/>
+                      </a:solidFill>
+                      <a:prstDash val="solid"/>
+                      <a:round/>
+                      <a:headEnd type="none" w="med" len="med"/>
+                      <a:tailEnd type="none" w="med" len="med"/>
+                    </a:lnT>
+                    <a:lnB w="12700" cap="flat" cmpd="sng" algn="ctr">
+                      <a:solidFill>
+                        <a:schemeClr val="tx1"/>
+                      </a:solidFill>
+                      <a:prstDash val="solid"/>
+                      <a:round/>
+                      <a:headEnd type="none" w="med" len="med"/>
+                      <a:tailEnd type="none" w="med" len="med"/>
+                    </a:lnB>
+                    <a:solidFill>
+                      <a:schemeClr val="bg1"/>
+                    </a:solidFill>
+                  </a:tcPr>
+                </a:tc>
+                <a:extLst>
+                  <a:ext uri="{0D108BD9-81ED-4DB2-BD59-A6C34878D82A}">
+                    <a16:rowId xmlns:a16="http://schemas.microsoft.com/office/drawing/2014/main" val="2679079526"/>
+                  </a:ext>
+                </a:extLst>
+              </a:tr>
+              <a:tr h="365760">
+                <a:tc>
+                  <a:txBody>
+                    <a:bodyPr/>
+                    <a:lstStyle/>
+                    <a:p>
+                      <a:endParaRPr lang="en-GB"/>
+                    </a:p>
+                  </a:txBody>
+                  <a:tcPr>
+                    <a:lnL w="12700" cap="flat" cmpd="sng" algn="ctr">
+                      <a:solidFill>
+                        <a:schemeClr val="tx1"/>
+                      </a:solidFill>
+                      <a:prstDash val="solid"/>
+                      <a:round/>
+                      <a:headEnd type="none" w="med" len="med"/>
+                      <a:tailEnd type="none" w="med" len="med"/>
+                    </a:lnL>
+                    <a:lnR w="12700" cap="flat" cmpd="sng" algn="ctr">
+                      <a:solidFill>
+                        <a:schemeClr val="tx1"/>
+                      </a:solidFill>
+                      <a:prstDash val="solid"/>
+                      <a:round/>
+                      <a:headEnd type="none" w="med" len="med"/>
+                      <a:tailEnd type="none" w="med" len="med"/>
+                    </a:lnR>
+                    <a:lnT w="12700" cap="flat" cmpd="sng" algn="ctr">
+                      <a:solidFill>
+                        <a:schemeClr val="tx1"/>
+                      </a:solidFill>
+                      <a:prstDash val="solid"/>
+                      <a:round/>
+                      <a:headEnd type="none" w="med" len="med"/>
+                      <a:tailEnd type="none" w="med" len="med"/>
+                    </a:lnT>
+                    <a:lnB w="12700" cap="flat" cmpd="sng" algn="ctr">
+                      <a:solidFill>
+                        <a:schemeClr val="tx1"/>
+                      </a:solidFill>
+                      <a:prstDash val="solid"/>
+                      <a:round/>
+                      <a:headEnd type="none" w="med" len="med"/>
+                      <a:tailEnd type="none" w="med" len="med"/>
+                    </a:lnB>
+                    <a:solidFill>
+                      <a:schemeClr val="bg1"/>
+                    </a:solidFill>
+                  </a:tcPr>
+                </a:tc>
+                <a:tc>
+                  <a:txBody>
+                    <a:bodyPr/>
+                    <a:lstStyle/>
+                    <a:p>
+                      <a:endParaRPr lang="en-GB" dirty="0"/>
+                    </a:p>
+                  </a:txBody>
+                  <a:tcPr>
+                    <a:lnL w="12700" cap="flat" cmpd="sng" algn="ctr">
+                      <a:solidFill>
+                        <a:schemeClr val="tx1"/>
+                      </a:solidFill>
+                      <a:prstDash val="solid"/>
+                      <a:round/>
+                      <a:headEnd type="none" w="med" len="med"/>
+                      <a:tailEnd type="none" w="med" len="med"/>
+                    </a:lnL>
+                    <a:lnR w="12700" cap="flat" cmpd="sng" algn="ctr">
+                      <a:solidFill>
+                        <a:schemeClr val="tx1"/>
+                      </a:solidFill>
+                      <a:prstDash val="solid"/>
+                      <a:round/>
+                      <a:headEnd type="none" w="med" len="med"/>
+                      <a:tailEnd type="none" w="med" len="med"/>
+                    </a:lnR>
+                    <a:lnT w="12700" cap="flat" cmpd="sng" algn="ctr">
+                      <a:solidFill>
+                        <a:schemeClr val="tx1"/>
+                      </a:solidFill>
+                      <a:prstDash val="solid"/>
+                      <a:round/>
+                      <a:headEnd type="none" w="med" len="med"/>
+                      <a:tailEnd type="none" w="med" len="med"/>
+                    </a:lnT>
+                    <a:lnB w="12700" cap="flat" cmpd="sng" algn="ctr">
+                      <a:solidFill>
+                        <a:schemeClr val="tx1"/>
+                      </a:solidFill>
+                      <a:prstDash val="solid"/>
+                      <a:round/>
+                      <a:headEnd type="none" w="med" len="med"/>
+                      <a:tailEnd type="none" w="med" len="med"/>
+                    </a:lnB>
+                    <a:solidFill>
+                      <a:schemeClr val="bg1"/>
+                    </a:solidFill>
+                  </a:tcPr>
+                </a:tc>
+                <a:tc>
+                  <a:txBody>
+                    <a:bodyPr/>
+                    <a:lstStyle/>
+                    <a:p>
+                      <a:endParaRPr lang="en-GB" dirty="0"/>
+                    </a:p>
+                  </a:txBody>
+                  <a:tcPr>
+                    <a:lnL w="12700" cap="flat" cmpd="sng" algn="ctr">
+                      <a:solidFill>
+                        <a:schemeClr val="tx1"/>
+                      </a:solidFill>
+                      <a:prstDash val="solid"/>
+                      <a:round/>
+                      <a:headEnd type="none" w="med" len="med"/>
+                      <a:tailEnd type="none" w="med" len="med"/>
+                    </a:lnL>
+                    <a:lnR w="12700" cap="flat" cmpd="sng" algn="ctr">
+                      <a:solidFill>
+                        <a:schemeClr val="tx1"/>
+                      </a:solidFill>
+                      <a:prstDash val="solid"/>
+                      <a:round/>
+                      <a:headEnd type="none" w="med" len="med"/>
+                      <a:tailEnd type="none" w="med" len="med"/>
+                    </a:lnR>
+                    <a:lnT w="12700" cap="flat" cmpd="sng" algn="ctr">
+                      <a:solidFill>
+                        <a:schemeClr val="tx1"/>
+                      </a:solidFill>
+                      <a:prstDash val="solid"/>
+                      <a:round/>
+                      <a:headEnd type="none" w="med" len="med"/>
+                      <a:tailEnd type="none" w="med" len="med"/>
+                    </a:lnT>
+                    <a:lnB w="12700" cap="flat" cmpd="sng" algn="ctr">
+                      <a:solidFill>
+                        <a:schemeClr val="tx1"/>
+                      </a:solidFill>
+                      <a:prstDash val="solid"/>
+                      <a:round/>
+                      <a:headEnd type="none" w="med" len="med"/>
+                      <a:tailEnd type="none" w="med" len="med"/>
+                    </a:lnB>
+                    <a:solidFill>
+                      <a:schemeClr val="bg1"/>
+                    </a:solidFill>
+                  </a:tcPr>
+                </a:tc>
+                <a:extLst>
+                  <a:ext uri="{0D108BD9-81ED-4DB2-BD59-A6C34878D82A}">
+                    <a16:rowId xmlns:a16="http://schemas.microsoft.com/office/drawing/2014/main" val="3171248002"/>
+                  </a:ext>
+                </a:extLst>
+              </a:tr>
+              <a:tr h="365760">
+                <a:tc>
+                  <a:txBody>
+                    <a:bodyPr/>
+                    <a:lstStyle/>
+                    <a:p>
+                      <a:endParaRPr lang="en-GB"/>
+                    </a:p>
+                  </a:txBody>
+                  <a:tcPr>
+                    <a:lnL w="12700" cap="flat" cmpd="sng" algn="ctr">
+                      <a:solidFill>
+                        <a:schemeClr val="tx1"/>
+                      </a:solidFill>
+                      <a:prstDash val="solid"/>
+                      <a:round/>
+                      <a:headEnd type="none" w="med" len="med"/>
+                      <a:tailEnd type="none" w="med" len="med"/>
+                    </a:lnL>
+                    <a:lnR w="12700" cap="flat" cmpd="sng" algn="ctr">
+                      <a:solidFill>
+                        <a:schemeClr val="tx1"/>
+                      </a:solidFill>
+                      <a:prstDash val="solid"/>
+                      <a:round/>
+                      <a:headEnd type="none" w="med" len="med"/>
+                      <a:tailEnd type="none" w="med" len="med"/>
+                    </a:lnR>
+                    <a:lnT w="12700" cap="flat" cmpd="sng" algn="ctr">
+                      <a:solidFill>
+                        <a:schemeClr val="tx1"/>
+                      </a:solidFill>
+                      <a:prstDash val="solid"/>
+                      <a:round/>
+                      <a:headEnd type="none" w="med" len="med"/>
+                      <a:tailEnd type="none" w="med" len="med"/>
+                    </a:lnT>
+                    <a:lnB w="12700" cap="flat" cmpd="sng" algn="ctr">
+                      <a:solidFill>
+                        <a:schemeClr val="tx1"/>
+                      </a:solidFill>
+                      <a:prstDash val="solid"/>
+                      <a:round/>
+                      <a:headEnd type="none" w="med" len="med"/>
+                      <a:tailEnd type="none" w="med" len="med"/>
+                    </a:lnB>
+                    <a:solidFill>
+                      <a:schemeClr val="bg1"/>
+                    </a:solidFill>
+                  </a:tcPr>
+                </a:tc>
+                <a:tc>
+                  <a:txBody>
+                    <a:bodyPr/>
+                    <a:lstStyle/>
+                    <a:p>
+                      <a:endParaRPr lang="en-GB"/>
+                    </a:p>
+                  </a:txBody>
+                  <a:tcPr>
+                    <a:lnL w="12700" cap="flat" cmpd="sng" algn="ctr">
+                      <a:solidFill>
+                        <a:schemeClr val="tx1"/>
+                      </a:solidFill>
+                      <a:prstDash val="solid"/>
+                      <a:round/>
+                      <a:headEnd type="none" w="med" len="med"/>
+                      <a:tailEnd type="none" w="med" len="med"/>
+                    </a:lnL>
+                    <a:lnR w="12700" cap="flat" cmpd="sng" algn="ctr">
+                      <a:solidFill>
+                        <a:schemeClr val="tx1"/>
+                      </a:solidFill>
+                      <a:prstDash val="solid"/>
+                      <a:round/>
+                      <a:headEnd type="none" w="med" len="med"/>
+                      <a:tailEnd type="none" w="med" len="med"/>
+                    </a:lnR>
+                    <a:lnT w="12700" cap="flat" cmpd="sng" algn="ctr">
+                      <a:solidFill>
+                        <a:schemeClr val="tx1"/>
+                      </a:solidFill>
+                      <a:prstDash val="solid"/>
+                      <a:round/>
+                      <a:headEnd type="none" w="med" len="med"/>
+                      <a:tailEnd type="none" w="med" len="med"/>
+                    </a:lnT>
+                    <a:lnB w="12700" cap="flat" cmpd="sng" algn="ctr">
+                      <a:solidFill>
+                        <a:schemeClr val="tx1"/>
+                      </a:solidFill>
+                      <a:prstDash val="solid"/>
+                      <a:round/>
+                      <a:headEnd type="none" w="med" len="med"/>
+                      <a:tailEnd type="none" w="med" len="med"/>
+                    </a:lnB>
+                    <a:solidFill>
+                      <a:schemeClr val="bg1"/>
+                    </a:solidFill>
+                  </a:tcPr>
+                </a:tc>
+                <a:tc>
+                  <a:txBody>
+                    <a:bodyPr/>
+                    <a:lstStyle/>
+                    <a:p>
+                      <a:endParaRPr lang="en-GB" dirty="0"/>
+                    </a:p>
+                  </a:txBody>
+                  <a:tcPr>
+                    <a:lnL w="12700" cap="flat" cmpd="sng" algn="ctr">
+                      <a:solidFill>
+                        <a:schemeClr val="tx1"/>
+                      </a:solidFill>
+                      <a:prstDash val="solid"/>
+                      <a:round/>
+                      <a:headEnd type="none" w="med" len="med"/>
+                      <a:tailEnd type="none" w="med" len="med"/>
+                    </a:lnL>
+                    <a:lnR w="12700" cap="flat" cmpd="sng" algn="ctr">
+                      <a:solidFill>
+                        <a:schemeClr val="tx1"/>
+                      </a:solidFill>
+                      <a:prstDash val="solid"/>
+                      <a:round/>
+                      <a:headEnd type="none" w="med" len="med"/>
+                      <a:tailEnd type="none" w="med" len="med"/>
+                    </a:lnR>
+                    <a:lnT w="12700" cap="flat" cmpd="sng" algn="ctr">
+                      <a:solidFill>
+                        <a:schemeClr val="tx1"/>
+                      </a:solidFill>
+                      <a:prstDash val="solid"/>
+                      <a:round/>
+                      <a:headEnd type="none" w="med" len="med"/>
+                      <a:tailEnd type="none" w="med" len="med"/>
+                    </a:lnT>
+                    <a:lnB w="12700" cap="flat" cmpd="sng" algn="ctr">
+                      <a:solidFill>
+                        <a:schemeClr val="tx1"/>
+                      </a:solidFill>
+                      <a:prstDash val="solid"/>
+                      <a:round/>
+                      <a:headEnd type="none" w="med" len="med"/>
+                      <a:tailEnd type="none" w="med" len="med"/>
+                    </a:lnB>
+                    <a:solidFill>
+                      <a:schemeClr val="bg1"/>
+                    </a:solidFill>
+                  </a:tcPr>
+                </a:tc>
+                <a:extLst>
+                  <a:ext uri="{0D108BD9-81ED-4DB2-BD59-A6C34878D82A}">
+                    <a16:rowId xmlns:a16="http://schemas.microsoft.com/office/drawing/2014/main" val="2256096956"/>
+                  </a:ext>
+                </a:extLst>
+              </a:tr>
+            </a:tbl>
+          </a:graphicData>
+        </a:graphic>
+      </p:graphicFrame>
+    </p:spTree>
+    <p:extLst>
+      <p:ext uri="{BB962C8B-B14F-4D97-AF65-F5344CB8AC3E}">
+        <p14:creationId xmlns:p14="http://schemas.microsoft.com/office/powerpoint/2010/main" val="2023844217"/>
       </p:ext>
     </p:extLst>
   </p:cSld>

</xml_diff>